<commit_message>
updated presentation and document
</commit_message>
<xml_diff>
--- a/Peer Review.pptx
+++ b/Peer Review.pptx
@@ -268,7 +268,7 @@
           <a:p>
             <a:fld id="{7101AC43-59F3-4FD1-81FF-6E3F82C4E0F9}" type="datetimeFigureOut">
               <a:rPr lang="de-DE" smtClean="0"/>
-              <a:t>05.06.2017</a:t>
+              <a:t>07.06.2017</a:t>
             </a:fld>
             <a:endParaRPr lang="de-DE"/>
           </a:p>
@@ -466,7 +466,7 @@
           <a:p>
             <a:fld id="{7101AC43-59F3-4FD1-81FF-6E3F82C4E0F9}" type="datetimeFigureOut">
               <a:rPr lang="de-DE" smtClean="0"/>
-              <a:t>05.06.2017</a:t>
+              <a:t>07.06.2017</a:t>
             </a:fld>
             <a:endParaRPr lang="de-DE"/>
           </a:p>
@@ -674,7 +674,7 @@
           <a:p>
             <a:fld id="{7101AC43-59F3-4FD1-81FF-6E3F82C4E0F9}" type="datetimeFigureOut">
               <a:rPr lang="de-DE" smtClean="0"/>
-              <a:t>05.06.2017</a:t>
+              <a:t>07.06.2017</a:t>
             </a:fld>
             <a:endParaRPr lang="de-DE"/>
           </a:p>
@@ -872,7 +872,7 @@
           <a:p>
             <a:fld id="{7101AC43-59F3-4FD1-81FF-6E3F82C4E0F9}" type="datetimeFigureOut">
               <a:rPr lang="de-DE" smtClean="0"/>
-              <a:t>05.06.2017</a:t>
+              <a:t>07.06.2017</a:t>
             </a:fld>
             <a:endParaRPr lang="de-DE"/>
           </a:p>
@@ -1147,7 +1147,7 @@
           <a:p>
             <a:fld id="{7101AC43-59F3-4FD1-81FF-6E3F82C4E0F9}" type="datetimeFigureOut">
               <a:rPr lang="de-DE" smtClean="0"/>
-              <a:t>05.06.2017</a:t>
+              <a:t>07.06.2017</a:t>
             </a:fld>
             <a:endParaRPr lang="de-DE"/>
           </a:p>
@@ -1412,7 +1412,7 @@
           <a:p>
             <a:fld id="{7101AC43-59F3-4FD1-81FF-6E3F82C4E0F9}" type="datetimeFigureOut">
               <a:rPr lang="de-DE" smtClean="0"/>
-              <a:t>05.06.2017</a:t>
+              <a:t>07.06.2017</a:t>
             </a:fld>
             <a:endParaRPr lang="de-DE"/>
           </a:p>
@@ -1824,7 +1824,7 @@
           <a:p>
             <a:fld id="{7101AC43-59F3-4FD1-81FF-6E3F82C4E0F9}" type="datetimeFigureOut">
               <a:rPr lang="de-DE" smtClean="0"/>
-              <a:t>05.06.2017</a:t>
+              <a:t>07.06.2017</a:t>
             </a:fld>
             <a:endParaRPr lang="de-DE"/>
           </a:p>
@@ -1965,7 +1965,7 @@
           <a:p>
             <a:fld id="{7101AC43-59F3-4FD1-81FF-6E3F82C4E0F9}" type="datetimeFigureOut">
               <a:rPr lang="de-DE" smtClean="0"/>
-              <a:t>05.06.2017</a:t>
+              <a:t>07.06.2017</a:t>
             </a:fld>
             <a:endParaRPr lang="de-DE"/>
           </a:p>
@@ -2078,7 +2078,7 @@
           <a:p>
             <a:fld id="{7101AC43-59F3-4FD1-81FF-6E3F82C4E0F9}" type="datetimeFigureOut">
               <a:rPr lang="de-DE" smtClean="0"/>
-              <a:t>05.06.2017</a:t>
+              <a:t>07.06.2017</a:t>
             </a:fld>
             <a:endParaRPr lang="de-DE"/>
           </a:p>
@@ -2389,7 +2389,7 @@
           <a:p>
             <a:fld id="{7101AC43-59F3-4FD1-81FF-6E3F82C4E0F9}" type="datetimeFigureOut">
               <a:rPr lang="de-DE" smtClean="0"/>
-              <a:t>05.06.2017</a:t>
+              <a:t>07.06.2017</a:t>
             </a:fld>
             <a:endParaRPr lang="de-DE"/>
           </a:p>
@@ -2677,7 +2677,7 @@
           <a:p>
             <a:fld id="{7101AC43-59F3-4FD1-81FF-6E3F82C4E0F9}" type="datetimeFigureOut">
               <a:rPr lang="de-DE" smtClean="0"/>
-              <a:t>05.06.2017</a:t>
+              <a:t>07.06.2017</a:t>
             </a:fld>
             <a:endParaRPr lang="de-DE"/>
           </a:p>
@@ -2918,7 +2918,7 @@
           <a:p>
             <a:fld id="{7101AC43-59F3-4FD1-81FF-6E3F82C4E0F9}" type="datetimeFigureOut">
               <a:rPr lang="de-DE" smtClean="0"/>
-              <a:t>05.06.2017</a:t>
+              <a:t>07.06.2017</a:t>
             </a:fld>
             <a:endParaRPr lang="de-DE"/>
           </a:p>
@@ -3560,7 +3560,7 @@
         </p:nvSpPr>
         <p:spPr>
           <a:xfrm>
-            <a:off x="200025" y="4733925"/>
+            <a:off x="4210048" y="4733925"/>
             <a:ext cx="3838575" cy="2038350"/>
           </a:xfrm>
           <a:prstGeom prst="rect">
@@ -3631,7 +3631,7 @@
         </p:nvSpPr>
         <p:spPr>
           <a:xfrm>
-            <a:off x="4210050" y="4733925"/>
+            <a:off x="219071" y="4733925"/>
             <a:ext cx="3838575" cy="2038350"/>
           </a:xfrm>
           <a:prstGeom prst="rect">
@@ -4077,7 +4077,7 @@
                                           </p:stCondLst>
                                         </p:cTn>
                                         <p:tgtEl>
-                                          <p:spTgt spid="6"/>
+                                          <p:spTgt spid="7"/>
                                         </p:tgtEl>
                                         <p:attrNameLst>
                                           <p:attrName>style.visibility</p:attrName>
@@ -4149,7 +4149,7 @@
                                           </p:stCondLst>
                                         </p:cTn>
                                         <p:tgtEl>
-                                          <p:spTgt spid="7"/>
+                                          <p:spTgt spid="6"/>
                                         </p:tgtEl>
                                         <p:attrNameLst>
                                           <p:attrName>style.visibility</p:attrName>

</xml_diff>